<commit_message>
updated db init script to select db after creations. Fixed some typos in ppt.
</commit_message>
<xml_diff>
--- a/SQL-master/SQL [2] Query buildings.pptx
+++ b/SQL-master/SQL [2] Query buildings.pptx
@@ -289,7 +289,7 @@
           <a:p>
             <a:fld id="{E23C31A4-E588-4D7D-8556-3E7A80E3618E}" type="datetimeFigureOut">
               <a:rPr lang="es-MX" smtClean="0"/>
-              <a:t>23/11/2016</a:t>
+              <a:t>25/11/2019</a:t>
             </a:fld>
             <a:endParaRPr lang="es-MX"/>
           </a:p>
@@ -467,7 +467,7 @@
               <a:pPr>
                 <a:defRPr/>
               </a:pPr>
-              <a:t>23/11/2016</a:t>
+              <a:t>25/11/2019</a:t>
             </a:fld>
             <a:endParaRPr lang="es-MX" dirty="0"/>
           </a:p>
@@ -7562,7 +7562,7 @@
           <a:noFill/>
           <a:extLst>
             <a:ext uri="{909E8E84-426E-40dd-AFC4-6F175D3DCCD1}">
-              <a14:hiddenFill xmlns="" xmlns:a14="http://schemas.microsoft.com/office/drawing/2010/main">
+              <a14:hiddenFill xmlns:a14="http://schemas.microsoft.com/office/drawing/2010/main" xmlns="">
                 <a:solidFill>
                   <a:srgbClr val="FFFFFF"/>
                 </a:solidFill>
@@ -7823,7 +7823,7 @@
           <a:noFill/>
           <a:extLst>
             <a:ext uri="{909E8E84-426E-40dd-AFC4-6F175D3DCCD1}">
-              <a14:hiddenFill xmlns="" xmlns:a14="http://schemas.microsoft.com/office/drawing/2010/main">
+              <a14:hiddenFill xmlns:a14="http://schemas.microsoft.com/office/drawing/2010/main" xmlns="">
                 <a:solidFill>
                   <a:srgbClr val="FFFFFF"/>
                 </a:solidFill>
@@ -9176,7 +9176,7 @@
           <a:noFill/>
           <a:extLst>
             <a:ext uri="{909E8E84-426E-40dd-AFC4-6F175D3DCCD1}">
-              <a14:hiddenFill xmlns="" xmlns:a14="http://schemas.microsoft.com/office/drawing/2010/main">
+              <a14:hiddenFill xmlns:a14="http://schemas.microsoft.com/office/drawing/2010/main" xmlns="">
                 <a:solidFill>
                   <a:srgbClr val="FFFFFF"/>
                 </a:solidFill>
@@ -9888,14 +9888,14 @@
           </a:ln>
           <a:extLst>
             <a:ext uri="{909E8E84-426E-40dd-AFC4-6F175D3DCCD1}">
-              <a14:hiddenFill xmlns="" xmlns:a14="http://schemas.microsoft.com/office/drawing/2010/main">
+              <a14:hiddenFill xmlns:a14="http://schemas.microsoft.com/office/drawing/2010/main" xmlns="">
                 <a:solidFill>
                   <a:srgbClr val="FFFFFF"/>
                 </a:solidFill>
               </a14:hiddenFill>
             </a:ext>
             <a:ext uri="{91240B29-F687-4f45-9708-019B960494DF}">
-              <a14:hiddenLine xmlns="" xmlns:a14="http://schemas.microsoft.com/office/drawing/2010/main" w="9525">
+              <a14:hiddenLine xmlns:a14="http://schemas.microsoft.com/office/drawing/2010/main" xmlns="" w="9525">
                 <a:solidFill>
                   <a:srgbClr val="000000"/>
                 </a:solidFill>
@@ -9971,14 +9971,14 @@
           </a:ln>
           <a:extLst>
             <a:ext uri="{909E8E84-426E-40dd-AFC4-6F175D3DCCD1}">
-              <a14:hiddenFill xmlns="" xmlns:a14="http://schemas.microsoft.com/office/drawing/2010/main">
+              <a14:hiddenFill xmlns:a14="http://schemas.microsoft.com/office/drawing/2010/main" xmlns="">
                 <a:solidFill>
                   <a:srgbClr val="FFFFFF"/>
                 </a:solidFill>
               </a14:hiddenFill>
             </a:ext>
             <a:ext uri="{91240B29-F687-4f45-9708-019B960494DF}">
-              <a14:hiddenLine xmlns="" xmlns:a14="http://schemas.microsoft.com/office/drawing/2010/main" w="9525">
+              <a14:hiddenLine xmlns:a14="http://schemas.microsoft.com/office/drawing/2010/main" xmlns="" w="9525">
                 <a:solidFill>
                   <a:srgbClr val="000000"/>
                 </a:solidFill>
@@ -10037,7 +10037,7 @@
           <a:noFill/>
           <a:extLst>
             <a:ext uri="{909E8E84-426E-40dd-AFC4-6F175D3DCCD1}">
-              <a14:hiddenFill xmlns="" xmlns:a14="http://schemas.microsoft.com/office/drawing/2010/main">
+              <a14:hiddenFill xmlns:a14="http://schemas.microsoft.com/office/drawing/2010/main" xmlns="">
                 <a:solidFill>
                   <a:srgbClr val="FFFFFF"/>
                 </a:solidFill>
@@ -10667,6 +10667,13 @@
   <p:clrMapOvr>
     <a:masterClrMapping/>
   </p:clrMapOvr>
+  <p:timing>
+    <p:tnLst>
+      <p:par>
+        <p:cTn id="1" dur="indefinite" restart="never" nodeType="tmRoot"/>
+      </p:par>
+    </p:tnLst>
+  </p:timing>
 </p:sld>
 </file>
 
@@ -10697,6 +10704,13 @@
   <p:clrMapOvr>
     <a:masterClrMapping/>
   </p:clrMapOvr>
+  <p:timing>
+    <p:tnLst>
+      <p:par>
+        <p:cTn id="1" dur="indefinite" restart="never" nodeType="tmRoot"/>
+      </p:par>
+    </p:tnLst>
+  </p:timing>
 </p:sld>
 </file>
 
@@ -11450,6 +11464,13 @@
   <p:clrMapOvr>
     <a:masterClrMapping/>
   </p:clrMapOvr>
+  <p:timing>
+    <p:tnLst>
+      <p:par>
+        <p:cTn id="1" dur="indefinite" restart="never" nodeType="tmRoot"/>
+      </p:par>
+    </p:tnLst>
+  </p:timing>
 </p:sld>
 </file>
 
@@ -12113,6 +12134,13 @@
   <p:clrMapOvr>
     <a:masterClrMapping/>
   </p:clrMapOvr>
+  <p:timing>
+    <p:tnLst>
+      <p:par>
+        <p:cTn id="1" dur="indefinite" restart="never" nodeType="tmRoot"/>
+      </p:par>
+    </p:tnLst>
+  </p:timing>
 </p:sld>
 </file>
 
@@ -13075,6 +13103,13 @@
   <p:clrMapOvr>
     <a:masterClrMapping/>
   </p:clrMapOvr>
+  <p:timing>
+    <p:tnLst>
+      <p:par>
+        <p:cTn id="1" dur="indefinite" restart="never" nodeType="tmRoot"/>
+      </p:par>
+    </p:tnLst>
+  </p:timing>
 </p:sld>
 </file>
 
@@ -13806,10 +13841,17 @@
                   <a:latin typeface="Courier New" panose="02070309020205020404" pitchFamily="49" charset="0"/>
                   <a:cs typeface="Courier New" panose="02070309020205020404" pitchFamily="49" charset="0"/>
                 </a:rPr>
-                <a:t> WHERE description LIKE '%</a:t>
-              </a:r>
-              <a:r>
-                <a:rPr lang="en-US" sz="900" dirty="0" err="1">
+                <a:t> WHERE description LIKE </a:t>
+              </a:r>
+              <a:r>
+                <a:rPr lang="en-US" sz="900" dirty="0" smtClean="0">
+                  <a:latin typeface="Courier New" panose="02070309020205020404" pitchFamily="49" charset="0"/>
+                  <a:cs typeface="Courier New" panose="02070309020205020404" pitchFamily="49" charset="0"/>
+                </a:rPr>
+                <a:t>'</a:t>
+              </a:r>
+              <a:r>
+                <a:rPr lang="en-US" sz="900" dirty="0" err="1" smtClean="0">
                   <a:latin typeface="Courier New" panose="02070309020205020404" pitchFamily="49" charset="0"/>
                   <a:cs typeface="Courier New" panose="02070309020205020404" pitchFamily="49" charset="0"/>
                 </a:rPr>
@@ -14286,6 +14328,13 @@
   <p:clrMapOvr>
     <a:masterClrMapping/>
   </p:clrMapOvr>
+  <p:timing>
+    <p:tnLst>
+      <p:par>
+        <p:cTn id="1" dur="indefinite" restart="never" nodeType="tmRoot"/>
+      </p:par>
+    </p:tnLst>
+  </p:timing>
 </p:sld>
 </file>
 
@@ -15103,6 +15152,13 @@
   <p:clrMapOvr>
     <a:masterClrMapping/>
   </p:clrMapOvr>
+  <p:timing>
+    <p:tnLst>
+      <p:par>
+        <p:cTn id="1" dur="indefinite" restart="never" nodeType="tmRoot"/>
+      </p:par>
+    </p:tnLst>
+  </p:timing>
 </p:sld>
 </file>
 
@@ -16284,6 +16340,13 @@
   <p:clrMapOvr>
     <a:masterClrMapping/>
   </p:clrMapOvr>
+  <p:timing>
+    <p:tnLst>
+      <p:par>
+        <p:cTn id="1" dur="indefinite" restart="never" nodeType="tmRoot"/>
+      </p:par>
+    </p:tnLst>
+  </p:timing>
 </p:sld>
 </file>
 
@@ -17290,6 +17353,13 @@
   <p:clrMapOvr>
     <a:masterClrMapping/>
   </p:clrMapOvr>
+  <p:timing>
+    <p:tnLst>
+      <p:par>
+        <p:cTn id="1" dur="indefinite" restart="never" nodeType="tmRoot"/>
+      </p:par>
+    </p:tnLst>
+  </p:timing>
 </p:sld>
 </file>
 
@@ -18076,10 +18146,10 @@
         </p:nvGrpSpPr>
         <p:grpSpPr>
           <a:xfrm>
-            <a:off x="5076056" y="3140968"/>
-            <a:ext cx="3666038" cy="2901588"/>
-            <a:chOff x="5076056" y="3356992"/>
-            <a:chExt cx="3666038" cy="2901588"/>
+            <a:off x="3923928" y="3140968"/>
+            <a:ext cx="5184576" cy="2901588"/>
+            <a:chOff x="3923928" y="3356992"/>
+            <a:chExt cx="5184576" cy="2901588"/>
           </a:xfrm>
         </p:grpSpPr>
         <p:pic>
@@ -18119,8 +18189,8 @@
           </p:nvSpPr>
           <p:spPr>
             <a:xfrm>
-              <a:off x="5076056" y="3356992"/>
-              <a:ext cx="3666038" cy="1338828"/>
+              <a:off x="3923928" y="3356992"/>
+              <a:ext cx="5184576" cy="1200329"/>
             </a:xfrm>
             <a:prstGeom prst="rect">
               <a:avLst/>
@@ -18283,16 +18353,22 @@
                 <a:t> </a:t>
               </a:r>
               <a:r>
-                <a:rPr lang="es-419" sz="900" dirty="0" err="1">
-                  <a:cs typeface="Courier New" panose="02070309020205020404" pitchFamily="49" charset="0"/>
-                </a:rPr>
-                <a:t>htan</a:t>
+                <a:rPr lang="es-419" sz="900" dirty="0" err="1" smtClean="0">
+                  <a:cs typeface="Courier New" panose="02070309020205020404" pitchFamily="49" charset="0"/>
+                </a:rPr>
+                <a:t>than</a:t>
+              </a:r>
+              <a:r>
+                <a:rPr lang="es-419" sz="900" dirty="0" smtClean="0">
+                  <a:cs typeface="Courier New" panose="02070309020205020404" pitchFamily="49" charset="0"/>
+                </a:rPr>
+                <a:t> </a:t>
               </a:r>
               <a:r>
                 <a:rPr lang="es-419" sz="900" dirty="0">
                   <a:cs typeface="Courier New" panose="02070309020205020404" pitchFamily="49" charset="0"/>
                 </a:rPr>
-                <a:t> 25 </a:t>
+                <a:t>25 </a:t>
               </a:r>
               <a:r>
                 <a:rPr lang="es-419" sz="900" dirty="0" err="1">
@@ -18367,7 +18443,7 @@
                   <a:latin typeface="Courier New" panose="02070309020205020404" pitchFamily="49" charset="0"/>
                   <a:cs typeface="Courier New" panose="02070309020205020404" pitchFamily="49" charset="0"/>
                 </a:rPr>
-                <a:t>      , IF (LENGTH(description) &gt; 25</a:t>
+                <a:t>      , </a:t>
               </a:r>
             </a:p>
             <a:p>
@@ -18376,7 +18452,28 @@
                   <a:latin typeface="Courier New" panose="02070309020205020404" pitchFamily="49" charset="0"/>
                   <a:cs typeface="Courier New" panose="02070309020205020404" pitchFamily="49" charset="0"/>
                 </a:rPr>
-                <a:t>      , CONCAT(SUBSTR(description,1,25), '...')</a:t>
+                <a:t>IF (LENGTH(description) &gt; </a:t>
+              </a:r>
+              <a:r>
+                <a:rPr lang="en-US" sz="900" dirty="0" smtClean="0">
+                  <a:latin typeface="Courier New" panose="02070309020205020404" pitchFamily="49" charset="0"/>
+                  <a:cs typeface="Courier New" panose="02070309020205020404" pitchFamily="49" charset="0"/>
+                </a:rPr>
+                <a:t>25</a:t>
+              </a:r>
+              <a:r>
+                <a:rPr lang="en-US" sz="900" dirty="0" smtClean="0">
+                  <a:latin typeface="Courier New" panose="02070309020205020404" pitchFamily="49" charset="0"/>
+                  <a:cs typeface="Courier New" panose="02070309020205020404" pitchFamily="49" charset="0"/>
+                </a:rPr>
+                <a:t>, CONCAT(SUBSTR(description,1,25</a:t>
+              </a:r>
+              <a:r>
+                <a:rPr lang="en-US" sz="900" dirty="0">
+                  <a:latin typeface="Courier New" panose="02070309020205020404" pitchFamily="49" charset="0"/>
+                  <a:cs typeface="Courier New" panose="02070309020205020404" pitchFamily="49" charset="0"/>
+                </a:rPr>
+                <a:t>), '...')</a:t>
               </a:r>
             </a:p>
             <a:p>
@@ -18414,6 +18511,13 @@
   <p:clrMapOvr>
     <a:masterClrMapping/>
   </p:clrMapOvr>
+  <p:timing>
+    <p:tnLst>
+      <p:par>
+        <p:cTn id="1" dur="indefinite" restart="never" nodeType="tmRoot"/>
+      </p:par>
+    </p:tnLst>
+  </p:timing>
 </p:sld>
 </file>
 
@@ -19352,18 +19456,18 @@
                 <a:t>delivery_date</a:t>
               </a:r>
               <a:r>
-                <a:rPr lang="en-US" sz="900" dirty="0">
+                <a:rPr lang="en-US" sz="900">
                   <a:latin typeface="Courier New" panose="02070309020205020404" pitchFamily="49" charset="0"/>
                   <a:cs typeface="Courier New" panose="02070309020205020404" pitchFamily="49" charset="0"/>
                 </a:rPr>
                 <a:t>) </a:t>
               </a:r>
               <a:r>
-                <a:rPr lang="en-US" sz="900" dirty="0" err="1">
-                  <a:latin typeface="Courier New" panose="02070309020205020404" pitchFamily="49" charset="0"/>
-                  <a:cs typeface="Courier New" panose="02070309020205020404" pitchFamily="49" charset="0"/>
-                </a:rPr>
-                <a:t>delivery_span</a:t>
+                <a:rPr lang="en-US" sz="900" smtClean="0">
+                  <a:latin typeface="Courier New" panose="02070309020205020404" pitchFamily="49" charset="0"/>
+                  <a:cs typeface="Courier New" panose="02070309020205020404" pitchFamily="49" charset="0"/>
+                </a:rPr>
+                <a:t>AS delivery_span</a:t>
               </a:r>
               <a:endParaRPr lang="en-US" sz="900" dirty="0">
                 <a:latin typeface="Courier New" panose="02070309020205020404" pitchFamily="49" charset="0"/>
@@ -19567,6 +19671,13 @@
   <p:clrMapOvr>
     <a:masterClrMapping/>
   </p:clrMapOvr>
+  <p:timing>
+    <p:tnLst>
+      <p:par>
+        <p:cTn id="1" dur="indefinite" restart="never" nodeType="tmRoot"/>
+      </p:par>
+    </p:tnLst>
+  </p:timing>
 </p:sld>
 </file>
 
@@ -20730,20 +20841,20 @@
 </file>
 
 <file path=customXml/item2.xml><?xml version="1.0" encoding="utf-8"?>
+<p:properties xmlns:p="http://schemas.microsoft.com/office/2006/metadata/properties" xmlns:xsi="http://www.w3.org/2001/XMLSchema-instance" xmlns:pc="http://schemas.microsoft.com/office/infopath/2007/PartnerControls">
+  <documentManagement>
+    <Data_x0020_Classification1 xmlns="90e5e253-50b2-47e0-ab40-088f51eedbac">Public</Data_x0020_Classification1>
+  </documentManagement>
+</p:properties>
+</file>
+
+<file path=customXml/item3.xml><?xml version="1.0" encoding="utf-8"?>
 <?mso-contentType ?>
 <FormTemplates xmlns="http://schemas.microsoft.com/sharepoint/v3/contenttype/forms">
   <Display>DocumentLibraryForm</Display>
   <Edit>DocumentLibraryForm</Edit>
   <New>DocumentLibraryForm</New>
 </FormTemplates>
-</file>
-
-<file path=customXml/item3.xml><?xml version="1.0" encoding="utf-8"?>
-<p:properties xmlns:p="http://schemas.microsoft.com/office/2006/metadata/properties" xmlns:xsi="http://www.w3.org/2001/XMLSchema-instance" xmlns:pc="http://schemas.microsoft.com/office/infopath/2007/PartnerControls">
-  <documentManagement>
-    <Data_x0020_Classification1 xmlns="90e5e253-50b2-47e0-ab40-088f51eedbac">Public</Data_x0020_Classification1>
-  </documentManagement>
-</p:properties>
 </file>
 
 <file path=customXml/itemProps1.xml><?xml version="1.0" encoding="utf-8"?>
@@ -20765,14 +20876,6 @@
 </file>
 
 <file path=customXml/itemProps2.xml><?xml version="1.0" encoding="utf-8"?>
-<ds:datastoreItem xmlns:ds="http://schemas.openxmlformats.org/officeDocument/2006/customXml" ds:itemID="{9D25E79C-CB22-414C-9E48-01ED10321A76}">
-  <ds:schemaRefs>
-    <ds:schemaRef ds:uri="http://schemas.microsoft.com/sharepoint/v3/contenttype/forms"/>
-  </ds:schemaRefs>
-</ds:datastoreItem>
-</file>
-
-<file path=customXml/itemProps3.xml><?xml version="1.0" encoding="utf-8"?>
 <ds:datastoreItem xmlns:ds="http://schemas.openxmlformats.org/officeDocument/2006/customXml" ds:itemID="{F878CFFA-FA4D-496F-B8D2-C7DD46C2A279}">
   <ds:schemaRefs>
     <ds:schemaRef ds:uri="http://schemas.microsoft.com/office/2006/documentManagement/types"/>
@@ -20786,4 +20889,12 @@
     <ds:schemaRef ds:uri="http://schemas.openxmlformats.org/package/2006/metadata/core-properties"/>
   </ds:schemaRefs>
 </ds:datastoreItem>
+</file>
+
+<file path=customXml/itemProps3.xml><?xml version="1.0" encoding="utf-8"?>
+<ds:datastoreItem xmlns:ds="http://schemas.openxmlformats.org/officeDocument/2006/customXml" ds:itemID="{9D25E79C-CB22-414C-9E48-01ED10321A76}">
+  <ds:schemaRefs>
+    <ds:schemaRef ds:uri="http://schemas.microsoft.com/sharepoint/v3/contenttype/forms"/>
+  </ds:schemaRefs>
+</ds:datastoreItem>
 </file>
</xml_diff>